<commit_message>
Site updated: 2020-01-04 22:37:39
</commit_message>
<xml_diff>
--- a/images/img.pptx
+++ b/images/img.pptx
@@ -432,7 +432,7 @@
           <a:p>
             <a:fld id="{97535D2F-E39D-4B0D-90FC-7512CB8589FA}" type="datetimeFigureOut">
               <a:rPr lang="zh-CN" altLang="en-US" smtClean="0"/>
-              <a:t>2019/12/22</a:t>
+              <a:t>2020/1/4</a:t>
             </a:fld>
             <a:endParaRPr lang="zh-CN" altLang="en-US"/>
           </a:p>
@@ -630,7 +630,7 @@
           <a:p>
             <a:fld id="{97535D2F-E39D-4B0D-90FC-7512CB8589FA}" type="datetimeFigureOut">
               <a:rPr lang="zh-CN" altLang="en-US" smtClean="0"/>
-              <a:t>2019/12/22</a:t>
+              <a:t>2020/1/4</a:t>
             </a:fld>
             <a:endParaRPr lang="zh-CN" altLang="en-US"/>
           </a:p>
@@ -838,7 +838,7 @@
           <a:p>
             <a:fld id="{97535D2F-E39D-4B0D-90FC-7512CB8589FA}" type="datetimeFigureOut">
               <a:rPr lang="zh-CN" altLang="en-US" smtClean="0"/>
-              <a:t>2019/12/22</a:t>
+              <a:t>2020/1/4</a:t>
             </a:fld>
             <a:endParaRPr lang="zh-CN" altLang="en-US"/>
           </a:p>
@@ -1036,7 +1036,7 @@
           <a:p>
             <a:fld id="{97535D2F-E39D-4B0D-90FC-7512CB8589FA}" type="datetimeFigureOut">
               <a:rPr lang="zh-CN" altLang="en-US" smtClean="0"/>
-              <a:t>2019/12/22</a:t>
+              <a:t>2020/1/4</a:t>
             </a:fld>
             <a:endParaRPr lang="zh-CN" altLang="en-US"/>
           </a:p>
@@ -1311,7 +1311,7 @@
           <a:p>
             <a:fld id="{97535D2F-E39D-4B0D-90FC-7512CB8589FA}" type="datetimeFigureOut">
               <a:rPr lang="zh-CN" altLang="en-US" smtClean="0"/>
-              <a:t>2019/12/22</a:t>
+              <a:t>2020/1/4</a:t>
             </a:fld>
             <a:endParaRPr lang="zh-CN" altLang="en-US"/>
           </a:p>
@@ -1576,7 +1576,7 @@
           <a:p>
             <a:fld id="{97535D2F-E39D-4B0D-90FC-7512CB8589FA}" type="datetimeFigureOut">
               <a:rPr lang="zh-CN" altLang="en-US" smtClean="0"/>
-              <a:t>2019/12/22</a:t>
+              <a:t>2020/1/4</a:t>
             </a:fld>
             <a:endParaRPr lang="zh-CN" altLang="en-US"/>
           </a:p>
@@ -1988,7 +1988,7 @@
           <a:p>
             <a:fld id="{97535D2F-E39D-4B0D-90FC-7512CB8589FA}" type="datetimeFigureOut">
               <a:rPr lang="zh-CN" altLang="en-US" smtClean="0"/>
-              <a:t>2019/12/22</a:t>
+              <a:t>2020/1/4</a:t>
             </a:fld>
             <a:endParaRPr lang="zh-CN" altLang="en-US"/>
           </a:p>
@@ -2129,7 +2129,7 @@
           <a:p>
             <a:fld id="{97535D2F-E39D-4B0D-90FC-7512CB8589FA}" type="datetimeFigureOut">
               <a:rPr lang="zh-CN" altLang="en-US" smtClean="0"/>
-              <a:t>2019/12/22</a:t>
+              <a:t>2020/1/4</a:t>
             </a:fld>
             <a:endParaRPr lang="zh-CN" altLang="en-US"/>
           </a:p>
@@ -2242,7 +2242,7 @@
           <a:p>
             <a:fld id="{97535D2F-E39D-4B0D-90FC-7512CB8589FA}" type="datetimeFigureOut">
               <a:rPr lang="zh-CN" altLang="en-US" smtClean="0"/>
-              <a:t>2019/12/22</a:t>
+              <a:t>2020/1/4</a:t>
             </a:fld>
             <a:endParaRPr lang="zh-CN" altLang="en-US"/>
           </a:p>
@@ -2553,7 +2553,7 @@
           <a:p>
             <a:fld id="{97535D2F-E39D-4B0D-90FC-7512CB8589FA}" type="datetimeFigureOut">
               <a:rPr lang="zh-CN" altLang="en-US" smtClean="0"/>
-              <a:t>2019/12/22</a:t>
+              <a:t>2020/1/4</a:t>
             </a:fld>
             <a:endParaRPr lang="zh-CN" altLang="en-US"/>
           </a:p>
@@ -2841,7 +2841,7 @@
           <a:p>
             <a:fld id="{97535D2F-E39D-4B0D-90FC-7512CB8589FA}" type="datetimeFigureOut">
               <a:rPr lang="zh-CN" altLang="en-US" smtClean="0"/>
-              <a:t>2019/12/22</a:t>
+              <a:t>2020/1/4</a:t>
             </a:fld>
             <a:endParaRPr lang="zh-CN" altLang="en-US"/>
           </a:p>
@@ -3082,7 +3082,7 @@
           <a:p>
             <a:fld id="{97535D2F-E39D-4B0D-90FC-7512CB8589FA}" type="datetimeFigureOut">
               <a:rPr lang="zh-CN" altLang="en-US" smtClean="0"/>
-              <a:t>2019/12/22</a:t>
+              <a:t>2020/1/4</a:t>
             </a:fld>
             <a:endParaRPr lang="zh-CN" altLang="en-US"/>
           </a:p>
@@ -4277,6 +4277,96 @@
           </p:spPr>
         </p:pic>
       </p:grpSp>
+      <p:pic>
+        <p:nvPicPr>
+          <p:cNvPr id="27" name="Picture 2" descr="Figure 1">
+            <a:extLst>
+              <a:ext uri="{FF2B5EF4-FFF2-40B4-BE49-F238E27FC236}">
+                <a16:creationId xmlns:a16="http://schemas.microsoft.com/office/drawing/2014/main" id="{2795A45E-3660-40CC-85B8-EF1D2B65B293}"/>
+              </a:ext>
+            </a:extLst>
+          </p:cNvPr>
+          <p:cNvPicPr>
+            <a:picLocks noChangeAspect="1" noChangeArrowheads="1"/>
+          </p:cNvPicPr>
+          <p:nvPr/>
+        </p:nvPicPr>
+        <p:blipFill rotWithShape="1">
+          <a:blip r:embed="rId11">
+            <a:extLst>
+              <a:ext uri="{28A0092B-C50C-407E-A947-70E740481C1C}">
+                <a14:useLocalDpi xmlns:a14="http://schemas.microsoft.com/office/drawing/2010/main" val="0"/>
+              </a:ext>
+            </a:extLst>
+          </a:blip>
+          <a:srcRect r="59348" b="9228"/>
+          <a:stretch/>
+        </p:blipFill>
+        <p:spPr bwMode="auto">
+          <a:xfrm>
+            <a:off x="7784210" y="4220160"/>
+            <a:ext cx="2129697" cy="2144218"/>
+          </a:xfrm>
+          <a:prstGeom prst="rect">
+            <a:avLst/>
+          </a:prstGeom>
+          <a:noFill/>
+          <a:extLst>
+            <a:ext uri="{909E8E84-426E-40DD-AFC4-6F175D3DCCD1}">
+              <a14:hiddenFill xmlns:a14="http://schemas.microsoft.com/office/drawing/2010/main">
+                <a:solidFill>
+                  <a:srgbClr val="FFFFFF"/>
+                </a:solidFill>
+              </a14:hiddenFill>
+            </a:ext>
+          </a:extLst>
+        </p:spPr>
+      </p:pic>
+      <p:pic>
+        <p:nvPicPr>
+          <p:cNvPr id="29" name="Picture 2" descr="Figure 1">
+            <a:extLst>
+              <a:ext uri="{FF2B5EF4-FFF2-40B4-BE49-F238E27FC236}">
+                <a16:creationId xmlns:a16="http://schemas.microsoft.com/office/drawing/2014/main" id="{D8111D1D-A576-484E-8D50-862B29054387}"/>
+              </a:ext>
+            </a:extLst>
+          </p:cNvPr>
+          <p:cNvPicPr>
+            <a:picLocks noChangeAspect="1" noChangeArrowheads="1"/>
+          </p:cNvPicPr>
+          <p:nvPr/>
+        </p:nvPicPr>
+        <p:blipFill rotWithShape="1">
+          <a:blip r:embed="rId11">
+            <a:extLst>
+              <a:ext uri="{28A0092B-C50C-407E-A947-70E740481C1C}">
+                <a14:useLocalDpi xmlns:a14="http://schemas.microsoft.com/office/drawing/2010/main" val="0"/>
+              </a:ext>
+            </a:extLst>
+          </a:blip>
+          <a:srcRect l="67126" t="12896" r="3974" b="21664"/>
+          <a:stretch/>
+        </p:blipFill>
+        <p:spPr bwMode="auto">
+          <a:xfrm>
+            <a:off x="10047924" y="4220160"/>
+            <a:ext cx="2100158" cy="2144218"/>
+          </a:xfrm>
+          <a:prstGeom prst="rect">
+            <a:avLst/>
+          </a:prstGeom>
+          <a:noFill/>
+          <a:extLst>
+            <a:ext uri="{909E8E84-426E-40DD-AFC4-6F175D3DCCD1}">
+              <a14:hiddenFill xmlns:a14="http://schemas.microsoft.com/office/drawing/2010/main">
+                <a:solidFill>
+                  <a:srgbClr val="FFFFFF"/>
+                </a:solidFill>
+              </a14:hiddenFill>
+            </a:ext>
+          </a:extLst>
+        </p:spPr>
+      </p:pic>
     </p:spTree>
     <p:extLst>
       <p:ext uri="{BB962C8B-B14F-4D97-AF65-F5344CB8AC3E}">

</xml_diff>

<commit_message>
Site updated: 2020-06-05 10:57:08
</commit_message>
<xml_diff>
--- a/images/img.pptx
+++ b/images/img.pptx
@@ -6,6 +6,7 @@
   </p:sldMasterIdLst>
   <p:sldIdLst>
     <p:sldId id="256" r:id="rId2"/>
+    <p:sldId id="257" r:id="rId3"/>
   </p:sldIdLst>
   <p:sldSz cx="12192000" cy="6858000"/>
   <p:notesSz cx="6858000" cy="9144000"/>
@@ -282,6 +283,349 @@
       </pc:sldChg>
     </pc:docChg>
   </pc:docChgLst>
+  <pc:docChgLst>
+    <pc:chgData name="曾 彭" userId="be4d4df676c4d30e" providerId="LiveId" clId="{CE7CF10D-C209-406B-BB07-E3881F8E6B56}"/>
+    <pc:docChg chg="undo custSel addSld modSld">
+      <pc:chgData name="曾 彭" userId="be4d4df676c4d30e" providerId="LiveId" clId="{CE7CF10D-C209-406B-BB07-E3881F8E6B56}" dt="2020-06-05T02:38:33.957" v="196" actId="1076"/>
+      <pc:docMkLst>
+        <pc:docMk/>
+      </pc:docMkLst>
+      <pc:sldChg chg="addSp delSp modSp mod">
+        <pc:chgData name="曾 彭" userId="be4d4df676c4d30e" providerId="LiveId" clId="{CE7CF10D-C209-406B-BB07-E3881F8E6B56}" dt="2020-06-05T02:30:59.991" v="96" actId="1076"/>
+        <pc:sldMkLst>
+          <pc:docMk/>
+          <pc:sldMk cId="3589921930" sldId="256"/>
+        </pc:sldMkLst>
+        <pc:spChg chg="mod">
+          <ac:chgData name="曾 彭" userId="be4d4df676c4d30e" providerId="LiveId" clId="{CE7CF10D-C209-406B-BB07-E3881F8E6B56}" dt="2020-06-05T02:30:38.880" v="88" actId="14100"/>
+          <ac:spMkLst>
+            <pc:docMk/>
+            <pc:sldMk cId="3589921930" sldId="256"/>
+            <ac:spMk id="5" creationId="{853044B2-5280-49FC-AB04-90643BB29F74}"/>
+          </ac:spMkLst>
+        </pc:spChg>
+        <pc:spChg chg="mod">
+          <ac:chgData name="曾 彭" userId="be4d4df676c4d30e" providerId="LiveId" clId="{CE7CF10D-C209-406B-BB07-E3881F8E6B56}" dt="2020-06-05T02:30:38.880" v="88" actId="14100"/>
+          <ac:spMkLst>
+            <pc:docMk/>
+            <pc:sldMk cId="3589921930" sldId="256"/>
+            <ac:spMk id="11" creationId="{48BE924B-5D2D-46FA-BEA9-0FCF87C58161}"/>
+          </ac:spMkLst>
+        </pc:spChg>
+        <pc:spChg chg="mod">
+          <ac:chgData name="曾 彭" userId="be4d4df676c4d30e" providerId="LiveId" clId="{CE7CF10D-C209-406B-BB07-E3881F8E6B56}" dt="2020-06-05T02:30:38.880" v="88" actId="14100"/>
+          <ac:spMkLst>
+            <pc:docMk/>
+            <pc:sldMk cId="3589921930" sldId="256"/>
+            <ac:spMk id="19" creationId="{B15FEAF0-F644-435E-9849-3792F3C4FED3}"/>
+          </ac:spMkLst>
+        </pc:spChg>
+        <pc:spChg chg="mod">
+          <ac:chgData name="曾 彭" userId="be4d4df676c4d30e" providerId="LiveId" clId="{CE7CF10D-C209-406B-BB07-E3881F8E6B56}" dt="2020-06-05T02:30:38.880" v="88" actId="14100"/>
+          <ac:spMkLst>
+            <pc:docMk/>
+            <pc:sldMk cId="3589921930" sldId="256"/>
+            <ac:spMk id="28" creationId="{B206D9A7-51D7-4BA7-803A-8C7D0191CB15}"/>
+          </ac:spMkLst>
+        </pc:spChg>
+        <pc:grpChg chg="del">
+          <ac:chgData name="曾 彭" userId="be4d4df676c4d30e" providerId="LiveId" clId="{CE7CF10D-C209-406B-BB07-E3881F8E6B56}" dt="2020-06-05T02:30:50.789" v="90" actId="21"/>
+          <ac:grpSpMkLst>
+            <pc:docMk/>
+            <pc:sldMk cId="3589921930" sldId="256"/>
+            <ac:grpSpMk id="6" creationId="{3EE3FB07-A4E4-4562-8B58-0B9B45FB6FA9}"/>
+          </ac:grpSpMkLst>
+        </pc:grpChg>
+        <pc:grpChg chg="del">
+          <ac:chgData name="曾 彭" userId="be4d4df676c4d30e" providerId="LiveId" clId="{CE7CF10D-C209-406B-BB07-E3881F8E6B56}" dt="2020-06-05T02:30:50.789" v="90" actId="21"/>
+          <ac:grpSpMkLst>
+            <pc:docMk/>
+            <pc:sldMk cId="3589921930" sldId="256"/>
+            <ac:grpSpMk id="7" creationId="{93FA8F16-AC65-4F1A-9D43-E881F26FB851}"/>
+          </ac:grpSpMkLst>
+        </pc:grpChg>
+        <pc:grpChg chg="mod">
+          <ac:chgData name="曾 彭" userId="be4d4df676c4d30e" providerId="LiveId" clId="{CE7CF10D-C209-406B-BB07-E3881F8E6B56}" dt="2020-06-05T02:30:38.880" v="88" actId="14100"/>
+          <ac:grpSpMkLst>
+            <pc:docMk/>
+            <pc:sldMk cId="3589921930" sldId="256"/>
+            <ac:grpSpMk id="14" creationId="{4C0DE856-95B9-48B1-A5C4-E5E599D21070}"/>
+          </ac:grpSpMkLst>
+        </pc:grpChg>
+        <pc:grpChg chg="mod">
+          <ac:chgData name="曾 彭" userId="be4d4df676c4d30e" providerId="LiveId" clId="{CE7CF10D-C209-406B-BB07-E3881F8E6B56}" dt="2020-06-05T02:30:38.880" v="88" actId="14100"/>
+          <ac:grpSpMkLst>
+            <pc:docMk/>
+            <pc:sldMk cId="3589921930" sldId="256"/>
+            <ac:grpSpMk id="15" creationId="{230E35DD-2ADE-41B5-ADD2-00F80D395500}"/>
+          </ac:grpSpMkLst>
+        </pc:grpChg>
+        <pc:grpChg chg="mod">
+          <ac:chgData name="曾 彭" userId="be4d4df676c4d30e" providerId="LiveId" clId="{CE7CF10D-C209-406B-BB07-E3881F8E6B56}" dt="2020-06-05T02:30:38.880" v="88" actId="14100"/>
+          <ac:grpSpMkLst>
+            <pc:docMk/>
+            <pc:sldMk cId="3589921930" sldId="256"/>
+            <ac:grpSpMk id="17" creationId="{8BF75EB5-2660-4A9A-B38A-A5F4B5D069BB}"/>
+          </ac:grpSpMkLst>
+        </pc:grpChg>
+        <pc:grpChg chg="mod">
+          <ac:chgData name="曾 彭" userId="be4d4df676c4d30e" providerId="LiveId" clId="{CE7CF10D-C209-406B-BB07-E3881F8E6B56}" dt="2020-06-05T02:30:38.880" v="88" actId="14100"/>
+          <ac:grpSpMkLst>
+            <pc:docMk/>
+            <pc:sldMk cId="3589921930" sldId="256"/>
+            <ac:grpSpMk id="26" creationId="{4200BD40-6EE6-4C70-A466-4FEB374670B3}"/>
+          </ac:grpSpMkLst>
+        </pc:grpChg>
+        <pc:picChg chg="mod">
+          <ac:chgData name="曾 彭" userId="be4d4df676c4d30e" providerId="LiveId" clId="{CE7CF10D-C209-406B-BB07-E3881F8E6B56}" dt="2020-06-05T02:30:38.880" v="88" actId="14100"/>
+          <ac:picMkLst>
+            <pc:docMk/>
+            <pc:sldMk cId="3589921930" sldId="256"/>
+            <ac:picMk id="4" creationId="{DE25FB8D-E186-49F6-9967-112A9DB77F50}"/>
+          </ac:picMkLst>
+        </pc:picChg>
+        <pc:picChg chg="mod">
+          <ac:chgData name="曾 彭" userId="be4d4df676c4d30e" providerId="LiveId" clId="{CE7CF10D-C209-406B-BB07-E3881F8E6B56}" dt="2020-06-05T02:30:38.880" v="88" actId="14100"/>
+          <ac:picMkLst>
+            <pc:docMk/>
+            <pc:sldMk cId="3589921930" sldId="256"/>
+            <ac:picMk id="8" creationId="{689A7F8C-FEF7-49A2-8269-197B60EA04B6}"/>
+          </ac:picMkLst>
+        </pc:picChg>
+        <pc:picChg chg="mod">
+          <ac:chgData name="曾 彭" userId="be4d4df676c4d30e" providerId="LiveId" clId="{CE7CF10D-C209-406B-BB07-E3881F8E6B56}" dt="2020-06-05T02:30:38.880" v="88" actId="14100"/>
+          <ac:picMkLst>
+            <pc:docMk/>
+            <pc:sldMk cId="3589921930" sldId="256"/>
+            <ac:picMk id="9" creationId="{39A045F5-B044-4E7F-8A2C-13CB8CC51083}"/>
+          </ac:picMkLst>
+        </pc:picChg>
+        <pc:picChg chg="add del mod">
+          <ac:chgData name="曾 彭" userId="be4d4df676c4d30e" providerId="LiveId" clId="{CE7CF10D-C209-406B-BB07-E3881F8E6B56}" dt="2020-06-05T02:30:50.789" v="90" actId="21"/>
+          <ac:picMkLst>
+            <pc:docMk/>
+            <pc:sldMk cId="3589921930" sldId="256"/>
+            <ac:picMk id="13" creationId="{181BBE41-0581-4287-AD3B-5E7887F69EFB}"/>
+          </ac:picMkLst>
+        </pc:picChg>
+        <pc:picChg chg="mod">
+          <ac:chgData name="曾 彭" userId="be4d4df676c4d30e" providerId="LiveId" clId="{CE7CF10D-C209-406B-BB07-E3881F8E6B56}" dt="2020-06-05T02:30:38.880" v="88" actId="14100"/>
+          <ac:picMkLst>
+            <pc:docMk/>
+            <pc:sldMk cId="3589921930" sldId="256"/>
+            <ac:picMk id="22" creationId="{34F57AB2-1899-433F-AE6B-4CF2B4DB67DB}"/>
+          </ac:picMkLst>
+        </pc:picChg>
+        <pc:picChg chg="mod">
+          <ac:chgData name="曾 彭" userId="be4d4df676c4d30e" providerId="LiveId" clId="{CE7CF10D-C209-406B-BB07-E3881F8E6B56}" dt="2020-06-05T02:30:38.880" v="88" actId="14100"/>
+          <ac:picMkLst>
+            <pc:docMk/>
+            <pc:sldMk cId="3589921930" sldId="256"/>
+            <ac:picMk id="23" creationId="{80D49B58-A3D2-424E-87E3-85312F5698A5}"/>
+          </ac:picMkLst>
+        </pc:picChg>
+        <pc:picChg chg="mod">
+          <ac:chgData name="曾 彭" userId="be4d4df676c4d30e" providerId="LiveId" clId="{CE7CF10D-C209-406B-BB07-E3881F8E6B56}" dt="2020-06-05T02:30:38.880" v="88" actId="14100"/>
+          <ac:picMkLst>
+            <pc:docMk/>
+            <pc:sldMk cId="3589921930" sldId="256"/>
+            <ac:picMk id="24" creationId="{132B01E4-E7E2-451C-B9A1-A8B1EA02E2E2}"/>
+          </ac:picMkLst>
+        </pc:picChg>
+        <pc:picChg chg="mod">
+          <ac:chgData name="曾 彭" userId="be4d4df676c4d30e" providerId="LiveId" clId="{CE7CF10D-C209-406B-BB07-E3881F8E6B56}" dt="2020-06-05T02:30:38.880" v="88" actId="14100"/>
+          <ac:picMkLst>
+            <pc:docMk/>
+            <pc:sldMk cId="3589921930" sldId="256"/>
+            <ac:picMk id="25" creationId="{582FA7DF-8043-45EE-AC43-F9D6D860F303}"/>
+          </ac:picMkLst>
+        </pc:picChg>
+        <pc:picChg chg="mod">
+          <ac:chgData name="曾 彭" userId="be4d4df676c4d30e" providerId="LiveId" clId="{CE7CF10D-C209-406B-BB07-E3881F8E6B56}" dt="2020-06-05T02:30:56.176" v="93" actId="1076"/>
+          <ac:picMkLst>
+            <pc:docMk/>
+            <pc:sldMk cId="3589921930" sldId="256"/>
+            <ac:picMk id="27" creationId="{2795A45E-3660-40CC-85B8-EF1D2B65B293}"/>
+          </ac:picMkLst>
+        </pc:picChg>
+        <pc:picChg chg="mod">
+          <ac:chgData name="曾 彭" userId="be4d4df676c4d30e" providerId="LiveId" clId="{CE7CF10D-C209-406B-BB07-E3881F8E6B56}" dt="2020-06-05T02:30:59.991" v="96" actId="1076"/>
+          <ac:picMkLst>
+            <pc:docMk/>
+            <pc:sldMk cId="3589921930" sldId="256"/>
+            <ac:picMk id="29" creationId="{D8111D1D-A576-484E-8D50-862B29054387}"/>
+          </ac:picMkLst>
+        </pc:picChg>
+        <pc:picChg chg="mod">
+          <ac:chgData name="曾 彭" userId="be4d4df676c4d30e" providerId="LiveId" clId="{CE7CF10D-C209-406B-BB07-E3881F8E6B56}" dt="2020-06-05T02:30:38.880" v="88" actId="14100"/>
+          <ac:picMkLst>
+            <pc:docMk/>
+            <pc:sldMk cId="3589921930" sldId="256"/>
+            <ac:picMk id="1026" creationId="{D868EE72-C84D-448D-A30E-586708685D42}"/>
+          </ac:picMkLst>
+        </pc:picChg>
+      </pc:sldChg>
+      <pc:sldChg chg="addSp delSp modSp new mod">
+        <pc:chgData name="曾 彭" userId="be4d4df676c4d30e" providerId="LiveId" clId="{CE7CF10D-C209-406B-BB07-E3881F8E6B56}" dt="2020-06-05T02:38:33.957" v="196" actId="1076"/>
+        <pc:sldMkLst>
+          <pc:docMk/>
+          <pc:sldMk cId="2385202454" sldId="257"/>
+        </pc:sldMkLst>
+        <pc:spChg chg="del">
+          <ac:chgData name="曾 彭" userId="be4d4df676c4d30e" providerId="LiveId" clId="{CE7CF10D-C209-406B-BB07-E3881F8E6B56}" dt="2020-06-05T02:31:07.656" v="98" actId="478"/>
+          <ac:spMkLst>
+            <pc:docMk/>
+            <pc:sldMk cId="2385202454" sldId="257"/>
+            <ac:spMk id="2" creationId="{5B087BC4-4871-4481-A900-FBCF036CBFD4}"/>
+          </ac:spMkLst>
+        </pc:spChg>
+        <pc:spChg chg="del">
+          <ac:chgData name="曾 彭" userId="be4d4df676c4d30e" providerId="LiveId" clId="{CE7CF10D-C209-406B-BB07-E3881F8E6B56}" dt="2020-06-05T02:31:07.656" v="98" actId="478"/>
+          <ac:spMkLst>
+            <pc:docMk/>
+            <pc:sldMk cId="2385202454" sldId="257"/>
+            <ac:spMk id="3" creationId="{B6CCE13B-BE21-4668-8DD9-5EBC00736D96}"/>
+          </ac:spMkLst>
+        </pc:spChg>
+        <pc:spChg chg="mod">
+          <ac:chgData name="曾 彭" userId="be4d4df676c4d30e" providerId="LiveId" clId="{CE7CF10D-C209-406B-BB07-E3881F8E6B56}" dt="2020-06-05T02:31:08.440" v="99"/>
+          <ac:spMkLst>
+            <pc:docMk/>
+            <pc:sldMk cId="2385202454" sldId="257"/>
+            <ac:spMk id="5" creationId="{0FB8CD1A-B549-4138-B531-5A3FE5BC13EA}"/>
+          </ac:spMkLst>
+        </pc:spChg>
+        <pc:spChg chg="mod">
+          <ac:chgData name="曾 彭" userId="be4d4df676c4d30e" providerId="LiveId" clId="{CE7CF10D-C209-406B-BB07-E3881F8E6B56}" dt="2020-06-05T02:31:41.265" v="113" actId="571"/>
+          <ac:spMkLst>
+            <pc:docMk/>
+            <pc:sldMk cId="2385202454" sldId="257"/>
+            <ac:spMk id="8" creationId="{0E7BA8F6-F3AB-489C-BC27-A96A1F95BCB3}"/>
+          </ac:spMkLst>
+        </pc:spChg>
+        <pc:spChg chg="add mod">
+          <ac:chgData name="曾 彭" userId="be4d4df676c4d30e" providerId="LiveId" clId="{CE7CF10D-C209-406B-BB07-E3881F8E6B56}" dt="2020-06-05T02:31:41.265" v="113" actId="571"/>
+          <ac:spMkLst>
+            <pc:docMk/>
+            <pc:sldMk cId="2385202454" sldId="257"/>
+            <ac:spMk id="11" creationId="{41AFE7C0-65E5-434B-B486-A4DEF5E04054}"/>
+          </ac:spMkLst>
+        </pc:spChg>
+        <pc:spChg chg="add mod ord">
+          <ac:chgData name="曾 彭" userId="be4d4df676c4d30e" providerId="LiveId" clId="{CE7CF10D-C209-406B-BB07-E3881F8E6B56}" dt="2020-06-05T02:37:57.385" v="188" actId="571"/>
+          <ac:spMkLst>
+            <pc:docMk/>
+            <pc:sldMk cId="2385202454" sldId="257"/>
+            <ac:spMk id="12" creationId="{883C9291-C137-49BB-B7FC-2624DAD619DC}"/>
+          </ac:spMkLst>
+        </pc:spChg>
+        <pc:spChg chg="add mod">
+          <ac:chgData name="曾 彭" userId="be4d4df676c4d30e" providerId="LiveId" clId="{CE7CF10D-C209-406B-BB07-E3881F8E6B56}" dt="2020-06-05T02:32:34.247" v="128" actId="571"/>
+          <ac:spMkLst>
+            <pc:docMk/>
+            <pc:sldMk cId="2385202454" sldId="257"/>
+            <ac:spMk id="13" creationId="{0A1F56E4-D267-4D82-85CE-CB5A159E138A}"/>
+          </ac:spMkLst>
+        </pc:spChg>
+        <pc:spChg chg="add del mod ord">
+          <ac:chgData name="曾 彭" userId="be4d4df676c4d30e" providerId="LiveId" clId="{CE7CF10D-C209-406B-BB07-E3881F8E6B56}" dt="2020-06-05T02:35:34.713" v="181" actId="478"/>
+          <ac:spMkLst>
+            <pc:docMk/>
+            <pc:sldMk cId="2385202454" sldId="257"/>
+            <ac:spMk id="14" creationId="{E795F64B-E1AA-465E-96F0-7775857B7BAD}"/>
+          </ac:spMkLst>
+        </pc:spChg>
+        <pc:spChg chg="add mod">
+          <ac:chgData name="曾 彭" userId="be4d4df676c4d30e" providerId="LiveId" clId="{CE7CF10D-C209-406B-BB07-E3881F8E6B56}" dt="2020-06-05T02:37:57.385" v="188" actId="571"/>
+          <ac:spMkLst>
+            <pc:docMk/>
+            <pc:sldMk cId="2385202454" sldId="257"/>
+            <ac:spMk id="18" creationId="{6CC260C6-F4A7-4362-8B5A-85E3155D1998}"/>
+          </ac:spMkLst>
+        </pc:spChg>
+        <pc:spChg chg="add mod ord">
+          <ac:chgData name="曾 彭" userId="be4d4df676c4d30e" providerId="LiveId" clId="{CE7CF10D-C209-406B-BB07-E3881F8E6B56}" dt="2020-06-05T02:38:31.206" v="195" actId="164"/>
+          <ac:spMkLst>
+            <pc:docMk/>
+            <pc:sldMk cId="2385202454" sldId="257"/>
+            <ac:spMk id="19" creationId="{B3904D96-F992-4CAD-8FB0-3C59075D32B7}"/>
+          </ac:spMkLst>
+        </pc:spChg>
+        <pc:grpChg chg="add mod">
+          <ac:chgData name="曾 彭" userId="be4d4df676c4d30e" providerId="LiveId" clId="{CE7CF10D-C209-406B-BB07-E3881F8E6B56}" dt="2020-06-05T02:31:21.240" v="105" actId="1076"/>
+          <ac:grpSpMkLst>
+            <pc:docMk/>
+            <pc:sldMk cId="2385202454" sldId="257"/>
+            <ac:grpSpMk id="4" creationId="{72550BB3-6E48-4279-A13D-75F23BEFCC3D}"/>
+          </ac:grpSpMkLst>
+        </pc:grpChg>
+        <pc:grpChg chg="add mod">
+          <ac:chgData name="曾 彭" userId="be4d4df676c4d30e" providerId="LiveId" clId="{CE7CF10D-C209-406B-BB07-E3881F8E6B56}" dt="2020-06-05T02:31:41.265" v="113" actId="571"/>
+          <ac:grpSpMkLst>
+            <pc:docMk/>
+            <pc:sldMk cId="2385202454" sldId="257"/>
+            <ac:grpSpMk id="7" creationId="{F17A27B8-B874-4CE5-A9E7-1987215D94A0}"/>
+          </ac:grpSpMkLst>
+        </pc:grpChg>
+        <pc:grpChg chg="add mod">
+          <ac:chgData name="曾 彭" userId="be4d4df676c4d30e" providerId="LiveId" clId="{CE7CF10D-C209-406B-BB07-E3881F8E6B56}" dt="2020-06-05T02:33:02.746" v="134" actId="164"/>
+          <ac:grpSpMkLst>
+            <pc:docMk/>
+            <pc:sldMk cId="2385202454" sldId="257"/>
+            <ac:grpSpMk id="15" creationId="{5AC16F7E-7914-48A3-AA5F-5E3B53D56BBC}"/>
+          </ac:grpSpMkLst>
+        </pc:grpChg>
+        <pc:grpChg chg="add mod">
+          <ac:chgData name="曾 彭" userId="be4d4df676c4d30e" providerId="LiveId" clId="{CE7CF10D-C209-406B-BB07-E3881F8E6B56}" dt="2020-06-05T02:37:57.385" v="188" actId="571"/>
+          <ac:grpSpMkLst>
+            <pc:docMk/>
+            <pc:sldMk cId="2385202454" sldId="257"/>
+            <ac:grpSpMk id="16" creationId="{77EA2504-47A6-4DC4-83CE-C74360101EDD}"/>
+          </ac:grpSpMkLst>
+        </pc:grpChg>
+        <pc:grpChg chg="add mod">
+          <ac:chgData name="曾 彭" userId="be4d4df676c4d30e" providerId="LiveId" clId="{CE7CF10D-C209-406B-BB07-E3881F8E6B56}" dt="2020-06-05T02:38:33.957" v="196" actId="1076"/>
+          <ac:grpSpMkLst>
+            <pc:docMk/>
+            <pc:sldMk cId="2385202454" sldId="257"/>
+            <ac:grpSpMk id="20" creationId="{F1291D0F-86FB-4FB3-880E-F52BA6CBC146}"/>
+          </ac:grpSpMkLst>
+        </pc:grpChg>
+        <pc:picChg chg="mod">
+          <ac:chgData name="曾 彭" userId="be4d4df676c4d30e" providerId="LiveId" clId="{CE7CF10D-C209-406B-BB07-E3881F8E6B56}" dt="2020-06-05T02:31:08.440" v="99"/>
+          <ac:picMkLst>
+            <pc:docMk/>
+            <pc:sldMk cId="2385202454" sldId="257"/>
+            <ac:picMk id="6" creationId="{4962951B-5338-4758-BB39-5E367967C6DE}"/>
+          </ac:picMkLst>
+        </pc:picChg>
+        <pc:picChg chg="mod">
+          <ac:chgData name="曾 彭" userId="be4d4df676c4d30e" providerId="LiveId" clId="{CE7CF10D-C209-406B-BB07-E3881F8E6B56}" dt="2020-06-05T02:31:41.265" v="113" actId="571"/>
+          <ac:picMkLst>
+            <pc:docMk/>
+            <pc:sldMk cId="2385202454" sldId="257"/>
+            <ac:picMk id="9" creationId="{4F8BD134-75E8-43BE-AA37-62B57F85C4B8}"/>
+          </ac:picMkLst>
+        </pc:picChg>
+        <pc:picChg chg="add mod">
+          <ac:chgData name="曾 彭" userId="be4d4df676c4d30e" providerId="LiveId" clId="{CE7CF10D-C209-406B-BB07-E3881F8E6B56}" dt="2020-06-05T02:37:57.385" v="188" actId="571"/>
+          <ac:picMkLst>
+            <pc:docMk/>
+            <pc:sldMk cId="2385202454" sldId="257"/>
+            <ac:picMk id="10" creationId="{A1D90E30-02D6-4E2E-AFA1-CC81DC5FBDD0}"/>
+          </ac:picMkLst>
+        </pc:picChg>
+        <pc:picChg chg="add mod">
+          <ac:chgData name="曾 彭" userId="be4d4df676c4d30e" providerId="LiveId" clId="{CE7CF10D-C209-406B-BB07-E3881F8E6B56}" dt="2020-06-05T02:38:31.206" v="195" actId="164"/>
+          <ac:picMkLst>
+            <pc:docMk/>
+            <pc:sldMk cId="2385202454" sldId="257"/>
+            <ac:picMk id="17" creationId="{D7788116-BB30-40ED-B242-2699891C5875}"/>
+          </ac:picMkLst>
+        </pc:picChg>
+      </pc:sldChg>
+    </pc:docChg>
+  </pc:docChgLst>
 </pc:chgInfo>
 </file>
 
@@ -432,7 +776,7 @@
           <a:p>
             <a:fld id="{97535D2F-E39D-4B0D-90FC-7512CB8589FA}" type="datetimeFigureOut">
               <a:rPr lang="zh-CN" altLang="en-US" smtClean="0"/>
-              <a:t>2020/1/4</a:t>
+              <a:t>2020/6/5</a:t>
             </a:fld>
             <a:endParaRPr lang="zh-CN" altLang="en-US"/>
           </a:p>
@@ -630,7 +974,7 @@
           <a:p>
             <a:fld id="{97535D2F-E39D-4B0D-90FC-7512CB8589FA}" type="datetimeFigureOut">
               <a:rPr lang="zh-CN" altLang="en-US" smtClean="0"/>
-              <a:t>2020/1/4</a:t>
+              <a:t>2020/6/5</a:t>
             </a:fld>
             <a:endParaRPr lang="zh-CN" altLang="en-US"/>
           </a:p>
@@ -838,7 +1182,7 @@
           <a:p>
             <a:fld id="{97535D2F-E39D-4B0D-90FC-7512CB8589FA}" type="datetimeFigureOut">
               <a:rPr lang="zh-CN" altLang="en-US" smtClean="0"/>
-              <a:t>2020/1/4</a:t>
+              <a:t>2020/6/5</a:t>
             </a:fld>
             <a:endParaRPr lang="zh-CN" altLang="en-US"/>
           </a:p>
@@ -1036,7 +1380,7 @@
           <a:p>
             <a:fld id="{97535D2F-E39D-4B0D-90FC-7512CB8589FA}" type="datetimeFigureOut">
               <a:rPr lang="zh-CN" altLang="en-US" smtClean="0"/>
-              <a:t>2020/1/4</a:t>
+              <a:t>2020/6/5</a:t>
             </a:fld>
             <a:endParaRPr lang="zh-CN" altLang="en-US"/>
           </a:p>
@@ -1311,7 +1655,7 @@
           <a:p>
             <a:fld id="{97535D2F-E39D-4B0D-90FC-7512CB8589FA}" type="datetimeFigureOut">
               <a:rPr lang="zh-CN" altLang="en-US" smtClean="0"/>
-              <a:t>2020/1/4</a:t>
+              <a:t>2020/6/5</a:t>
             </a:fld>
             <a:endParaRPr lang="zh-CN" altLang="en-US"/>
           </a:p>
@@ -1576,7 +1920,7 @@
           <a:p>
             <a:fld id="{97535D2F-E39D-4B0D-90FC-7512CB8589FA}" type="datetimeFigureOut">
               <a:rPr lang="zh-CN" altLang="en-US" smtClean="0"/>
-              <a:t>2020/1/4</a:t>
+              <a:t>2020/6/5</a:t>
             </a:fld>
             <a:endParaRPr lang="zh-CN" altLang="en-US"/>
           </a:p>
@@ -1988,7 +2332,7 @@
           <a:p>
             <a:fld id="{97535D2F-E39D-4B0D-90FC-7512CB8589FA}" type="datetimeFigureOut">
               <a:rPr lang="zh-CN" altLang="en-US" smtClean="0"/>
-              <a:t>2020/1/4</a:t>
+              <a:t>2020/6/5</a:t>
             </a:fld>
             <a:endParaRPr lang="zh-CN" altLang="en-US"/>
           </a:p>
@@ -2129,7 +2473,7 @@
           <a:p>
             <a:fld id="{97535D2F-E39D-4B0D-90FC-7512CB8589FA}" type="datetimeFigureOut">
               <a:rPr lang="zh-CN" altLang="en-US" smtClean="0"/>
-              <a:t>2020/1/4</a:t>
+              <a:t>2020/6/5</a:t>
             </a:fld>
             <a:endParaRPr lang="zh-CN" altLang="en-US"/>
           </a:p>
@@ -2242,7 +2586,7 @@
           <a:p>
             <a:fld id="{97535D2F-E39D-4B0D-90FC-7512CB8589FA}" type="datetimeFigureOut">
               <a:rPr lang="zh-CN" altLang="en-US" smtClean="0"/>
-              <a:t>2020/1/4</a:t>
+              <a:t>2020/6/5</a:t>
             </a:fld>
             <a:endParaRPr lang="zh-CN" altLang="en-US"/>
           </a:p>
@@ -2553,7 +2897,7 @@
           <a:p>
             <a:fld id="{97535D2F-E39D-4B0D-90FC-7512CB8589FA}" type="datetimeFigureOut">
               <a:rPr lang="zh-CN" altLang="en-US" smtClean="0"/>
-              <a:t>2020/1/4</a:t>
+              <a:t>2020/6/5</a:t>
             </a:fld>
             <a:endParaRPr lang="zh-CN" altLang="en-US"/>
           </a:p>
@@ -2841,7 +3185,7 @@
           <a:p>
             <a:fld id="{97535D2F-E39D-4B0D-90FC-7512CB8589FA}" type="datetimeFigureOut">
               <a:rPr lang="zh-CN" altLang="en-US" smtClean="0"/>
-              <a:t>2020/1/4</a:t>
+              <a:t>2020/6/5</a:t>
             </a:fld>
             <a:endParaRPr lang="zh-CN" altLang="en-US"/>
           </a:p>
@@ -3082,7 +3426,7 @@
           <a:p>
             <a:fld id="{97535D2F-E39D-4B0D-90FC-7512CB8589FA}" type="datetimeFigureOut">
               <a:rPr lang="zh-CN" altLang="en-US" smtClean="0"/>
-              <a:t>2020/1/4</a:t>
+              <a:t>2020/6/5</a:t>
             </a:fld>
             <a:endParaRPr lang="zh-CN" altLang="en-US"/>
           </a:p>
@@ -3801,215 +4145,6 @@
       </p:grpSp>
       <p:grpSp>
         <p:nvGrpSpPr>
-          <p:cNvPr id="7" name="组合 6">
-            <a:extLst>
-              <a:ext uri="{FF2B5EF4-FFF2-40B4-BE49-F238E27FC236}">
-                <a16:creationId xmlns:a16="http://schemas.microsoft.com/office/drawing/2014/main" id="{93FA8F16-AC65-4F1A-9D43-E881F26FB851}"/>
-              </a:ext>
-            </a:extLst>
-          </p:cNvPr>
-          <p:cNvGrpSpPr/>
-          <p:nvPr/>
-        </p:nvGrpSpPr>
-        <p:grpSpPr>
-          <a:xfrm>
-            <a:off x="10182476" y="-1"/>
-            <a:ext cx="2009524" cy="2019247"/>
-            <a:chOff x="10182476" y="-1"/>
-            <a:chExt cx="2009524" cy="2019247"/>
-          </a:xfrm>
-        </p:grpSpPr>
-        <p:sp>
-          <p:nvSpPr>
-            <p:cNvPr id="10" name="矩形 9">
-              <a:extLst>
-                <a:ext uri="{FF2B5EF4-FFF2-40B4-BE49-F238E27FC236}">
-                  <a16:creationId xmlns:a16="http://schemas.microsoft.com/office/drawing/2014/main" id="{3E6826A1-2384-4D95-98A2-16465B375C74}"/>
-                </a:ext>
-              </a:extLst>
-            </p:cNvPr>
-            <p:cNvSpPr/>
-            <p:nvPr/>
-          </p:nvSpPr>
-          <p:spPr>
-            <a:xfrm>
-              <a:off x="10182476" y="-1"/>
-              <a:ext cx="2009524" cy="2010179"/>
-            </a:xfrm>
-            <a:prstGeom prst="rect">
-              <a:avLst/>
-            </a:prstGeom>
-            <a:solidFill>
-              <a:schemeClr val="bg1"/>
-            </a:solidFill>
-            <a:ln>
-              <a:solidFill>
-                <a:schemeClr val="bg1"/>
-              </a:solidFill>
-            </a:ln>
-          </p:spPr>
-          <p:style>
-            <a:lnRef idx="2">
-              <a:schemeClr val="accent1">
-                <a:shade val="50000"/>
-              </a:schemeClr>
-            </a:lnRef>
-            <a:fillRef idx="1">
-              <a:schemeClr val="accent1"/>
-            </a:fillRef>
-            <a:effectRef idx="0">
-              <a:schemeClr val="accent1"/>
-            </a:effectRef>
-            <a:fontRef idx="minor">
-              <a:schemeClr val="lt1"/>
-            </a:fontRef>
-          </p:style>
-          <p:txBody>
-            <a:bodyPr rtlCol="0" anchor="ctr"/>
-            <a:lstStyle/>
-            <a:p>
-              <a:pPr algn="ctr"/>
-              <a:endParaRPr lang="zh-CN" altLang="en-US"/>
-            </a:p>
-          </p:txBody>
-        </p:sp>
-        <p:pic>
-          <p:nvPicPr>
-            <p:cNvPr id="2" name="图片 1">
-              <a:extLst>
-                <a:ext uri="{FF2B5EF4-FFF2-40B4-BE49-F238E27FC236}">
-                  <a16:creationId xmlns:a16="http://schemas.microsoft.com/office/drawing/2014/main" id="{AFCF9734-207A-46DC-ACA0-8D5E2C4A1AD6}"/>
-                </a:ext>
-              </a:extLst>
-            </p:cNvPr>
-            <p:cNvPicPr>
-              <a:picLocks noChangeAspect="1"/>
-            </p:cNvPicPr>
-            <p:nvPr/>
-          </p:nvPicPr>
-          <p:blipFill>
-            <a:blip r:embed="rId5"/>
-            <a:stretch>
-              <a:fillRect/>
-            </a:stretch>
-          </p:blipFill>
-          <p:spPr>
-            <a:xfrm>
-              <a:off x="10182476" y="9722"/>
-              <a:ext cx="2009524" cy="2009524"/>
-            </a:xfrm>
-            <a:prstGeom prst="rect">
-              <a:avLst/>
-            </a:prstGeom>
-          </p:spPr>
-        </p:pic>
-      </p:grpSp>
-      <p:grpSp>
-        <p:nvGrpSpPr>
-          <p:cNvPr id="6" name="组合 5">
-            <a:extLst>
-              <a:ext uri="{FF2B5EF4-FFF2-40B4-BE49-F238E27FC236}">
-                <a16:creationId xmlns:a16="http://schemas.microsoft.com/office/drawing/2014/main" id="{3EE3FB07-A4E4-4562-8B58-0B9B45FB6FA9}"/>
-              </a:ext>
-            </a:extLst>
-          </p:cNvPr>
-          <p:cNvGrpSpPr/>
-          <p:nvPr/>
-        </p:nvGrpSpPr>
-        <p:grpSpPr>
-          <a:xfrm>
-            <a:off x="7974985" y="0"/>
-            <a:ext cx="2009524" cy="2010179"/>
-            <a:chOff x="7974985" y="0"/>
-            <a:chExt cx="2009524" cy="2010179"/>
-          </a:xfrm>
-        </p:grpSpPr>
-        <p:sp>
-          <p:nvSpPr>
-            <p:cNvPr id="12" name="矩形 11">
-              <a:extLst>
-                <a:ext uri="{FF2B5EF4-FFF2-40B4-BE49-F238E27FC236}">
-                  <a16:creationId xmlns:a16="http://schemas.microsoft.com/office/drawing/2014/main" id="{AF752019-CB78-412C-B9B6-AF1F9979E491}"/>
-                </a:ext>
-              </a:extLst>
-            </p:cNvPr>
-            <p:cNvSpPr/>
-            <p:nvPr/>
-          </p:nvSpPr>
-          <p:spPr>
-            <a:xfrm>
-              <a:off x="7974985" y="0"/>
-              <a:ext cx="2009524" cy="2010179"/>
-            </a:xfrm>
-            <a:prstGeom prst="rect">
-              <a:avLst/>
-            </a:prstGeom>
-            <a:solidFill>
-              <a:schemeClr val="bg1"/>
-            </a:solidFill>
-            <a:ln>
-              <a:solidFill>
-                <a:schemeClr val="bg1"/>
-              </a:solidFill>
-            </a:ln>
-          </p:spPr>
-          <p:style>
-            <a:lnRef idx="2">
-              <a:schemeClr val="accent1">
-                <a:shade val="50000"/>
-              </a:schemeClr>
-            </a:lnRef>
-            <a:fillRef idx="1">
-              <a:schemeClr val="accent1"/>
-            </a:fillRef>
-            <a:effectRef idx="0">
-              <a:schemeClr val="accent1"/>
-            </a:effectRef>
-            <a:fontRef idx="minor">
-              <a:schemeClr val="lt1"/>
-            </a:fontRef>
-          </p:style>
-          <p:txBody>
-            <a:bodyPr rtlCol="0" anchor="ctr"/>
-            <a:lstStyle/>
-            <a:p>
-              <a:pPr algn="ctr"/>
-              <a:endParaRPr lang="zh-CN" altLang="en-US"/>
-            </a:p>
-          </p:txBody>
-        </p:sp>
-        <p:pic>
-          <p:nvPicPr>
-            <p:cNvPr id="3" name="图片 2">
-              <a:extLst>
-                <a:ext uri="{FF2B5EF4-FFF2-40B4-BE49-F238E27FC236}">
-                  <a16:creationId xmlns:a16="http://schemas.microsoft.com/office/drawing/2014/main" id="{6D76F20C-4D8D-4446-9366-632B0810747A}"/>
-                </a:ext>
-              </a:extLst>
-            </p:cNvPr>
-            <p:cNvPicPr>
-              <a:picLocks noChangeAspect="1"/>
-            </p:cNvPicPr>
-            <p:nvPr/>
-          </p:nvPicPr>
-          <p:blipFill rotWithShape="1">
-            <a:blip r:embed="rId6"/>
-            <a:srcRect l="4409" t="11199" r="11642" b="6798"/>
-            <a:stretch/>
-          </p:blipFill>
-          <p:spPr>
-            <a:xfrm>
-              <a:off x="8052863" y="141488"/>
-              <a:ext cx="1442119" cy="1745674"/>
-            </a:xfrm>
-            <a:prstGeom prst="rect">
-              <a:avLst/>
-            </a:prstGeom>
-          </p:spPr>
-        </p:pic>
-      </p:grpSp>
-      <p:grpSp>
-        <p:nvGrpSpPr>
           <p:cNvPr id="17" name="组合 16">
             <a:extLst>
               <a:ext uri="{FF2B5EF4-FFF2-40B4-BE49-F238E27FC236}">
@@ -4097,7 +4232,7 @@
             <p:nvPr/>
           </p:nvPicPr>
           <p:blipFill>
-            <a:blip r:embed="rId7"/>
+            <a:blip r:embed="rId5"/>
             <a:stretch>
               <a:fillRect/>
             </a:stretch>
@@ -4127,7 +4262,7 @@
             <p:nvPr/>
           </p:nvPicPr>
           <p:blipFill rotWithShape="1">
-            <a:blip r:embed="rId8"/>
+            <a:blip r:embed="rId6"/>
             <a:srcRect b="13150"/>
             <a:stretch/>
           </p:blipFill>
@@ -4231,7 +4366,7 @@
             <p:nvPr/>
           </p:nvPicPr>
           <p:blipFill>
-            <a:blip r:embed="rId9"/>
+            <a:blip r:embed="rId7"/>
             <a:stretch>
               <a:fillRect/>
             </a:stretch>
@@ -4261,7 +4396,7 @@
             <p:nvPr/>
           </p:nvPicPr>
           <p:blipFill>
-            <a:blip r:embed="rId10"/>
+            <a:blip r:embed="rId8"/>
             <a:stretch>
               <a:fillRect/>
             </a:stretch>
@@ -4292,7 +4427,7 @@
           <p:nvPr/>
         </p:nvPicPr>
         <p:blipFill rotWithShape="1">
-          <a:blip r:embed="rId11">
+          <a:blip r:embed="rId9">
             <a:extLst>
               <a:ext uri="{28A0092B-C50C-407E-A947-70E740481C1C}">
                 <a14:useLocalDpi xmlns:a14="http://schemas.microsoft.com/office/drawing/2010/main" val="0"/>
@@ -4304,8 +4439,8 @@
         </p:blipFill>
         <p:spPr bwMode="auto">
           <a:xfrm>
-            <a:off x="7784210" y="4220160"/>
-            <a:ext cx="2129697" cy="2144218"/>
+            <a:off x="8488087" y="294064"/>
+            <a:ext cx="3119674" cy="3140945"/>
           </a:xfrm>
           <a:prstGeom prst="rect">
             <a:avLst/>
@@ -4337,7 +4472,7 @@
           <p:nvPr/>
         </p:nvPicPr>
         <p:blipFill rotWithShape="1">
-          <a:blip r:embed="rId11">
+          <a:blip r:embed="rId9">
             <a:extLst>
               <a:ext uri="{28A0092B-C50C-407E-A947-70E740481C1C}">
                 <a14:useLocalDpi xmlns:a14="http://schemas.microsoft.com/office/drawing/2010/main" val="0"/>
@@ -4349,8 +4484,8 @@
         </p:blipFill>
         <p:spPr bwMode="auto">
           <a:xfrm>
-            <a:off x="10047924" y="4220160"/>
-            <a:ext cx="2100158" cy="2144218"/>
+            <a:off x="8575028" y="3580976"/>
+            <a:ext cx="2892454" cy="2953136"/>
           </a:xfrm>
           <a:prstGeom prst="rect">
             <a:avLst/>
@@ -4371,6 +4506,455 @@
     <p:extLst>
       <p:ext uri="{BB962C8B-B14F-4D97-AF65-F5344CB8AC3E}">
         <p14:creationId xmlns:p14="http://schemas.microsoft.com/office/powerpoint/2010/main" val="3589921930"/>
+      </p:ext>
+    </p:extLst>
+  </p:cSld>
+  <p:clrMapOvr>
+    <a:masterClrMapping/>
+  </p:clrMapOvr>
+</p:sld>
+</file>
+
+<file path=ppt/slides/slide2.xml><?xml version="1.0" encoding="utf-8"?>
+<p:sld xmlns:a="http://schemas.openxmlformats.org/drawingml/2006/main" xmlns:r="http://schemas.openxmlformats.org/officeDocument/2006/relationships" xmlns:p="http://schemas.openxmlformats.org/presentationml/2006/main">
+  <p:cSld>
+    <p:spTree>
+      <p:nvGrpSpPr>
+        <p:cNvPr id="1" name=""/>
+        <p:cNvGrpSpPr/>
+        <p:nvPr/>
+      </p:nvGrpSpPr>
+      <p:grpSpPr>
+        <a:xfrm>
+          <a:off x="0" y="0"/>
+          <a:ext cx="0" cy="0"/>
+          <a:chOff x="0" y="0"/>
+          <a:chExt cx="0" cy="0"/>
+        </a:xfrm>
+      </p:grpSpPr>
+      <p:grpSp>
+        <p:nvGrpSpPr>
+          <p:cNvPr id="4" name="组合 3">
+            <a:extLst>
+              <a:ext uri="{FF2B5EF4-FFF2-40B4-BE49-F238E27FC236}">
+                <a16:creationId xmlns:a16="http://schemas.microsoft.com/office/drawing/2014/main" id="{72550BB3-6E48-4279-A13D-75F23BEFCC3D}"/>
+              </a:ext>
+            </a:extLst>
+          </p:cNvPr>
+          <p:cNvGrpSpPr/>
+          <p:nvPr/>
+        </p:nvGrpSpPr>
+        <p:grpSpPr>
+          <a:xfrm>
+            <a:off x="63844" y="3569948"/>
+            <a:ext cx="3128341" cy="2818661"/>
+            <a:chOff x="10182476" y="-1"/>
+            <a:chExt cx="2009524" cy="2019247"/>
+          </a:xfrm>
+        </p:grpSpPr>
+        <p:sp>
+          <p:nvSpPr>
+            <p:cNvPr id="5" name="矩形 4">
+              <a:extLst>
+                <a:ext uri="{FF2B5EF4-FFF2-40B4-BE49-F238E27FC236}">
+                  <a16:creationId xmlns:a16="http://schemas.microsoft.com/office/drawing/2014/main" id="{0FB8CD1A-B549-4138-B531-5A3FE5BC13EA}"/>
+                </a:ext>
+              </a:extLst>
+            </p:cNvPr>
+            <p:cNvSpPr/>
+            <p:nvPr/>
+          </p:nvSpPr>
+          <p:spPr>
+            <a:xfrm>
+              <a:off x="10182476" y="-1"/>
+              <a:ext cx="2009524" cy="2010179"/>
+            </a:xfrm>
+            <a:prstGeom prst="rect">
+              <a:avLst/>
+            </a:prstGeom>
+            <a:solidFill>
+              <a:schemeClr val="bg1"/>
+            </a:solidFill>
+            <a:ln>
+              <a:solidFill>
+                <a:schemeClr val="bg1"/>
+              </a:solidFill>
+            </a:ln>
+          </p:spPr>
+          <p:style>
+            <a:lnRef idx="2">
+              <a:schemeClr val="accent1">
+                <a:shade val="50000"/>
+              </a:schemeClr>
+            </a:lnRef>
+            <a:fillRef idx="1">
+              <a:schemeClr val="accent1"/>
+            </a:fillRef>
+            <a:effectRef idx="0">
+              <a:schemeClr val="accent1"/>
+            </a:effectRef>
+            <a:fontRef idx="minor">
+              <a:schemeClr val="lt1"/>
+            </a:fontRef>
+          </p:style>
+          <p:txBody>
+            <a:bodyPr rtlCol="0" anchor="ctr"/>
+            <a:lstStyle/>
+            <a:p>
+              <a:pPr algn="ctr"/>
+              <a:endParaRPr lang="zh-CN" altLang="en-US"/>
+            </a:p>
+          </p:txBody>
+        </p:sp>
+        <p:pic>
+          <p:nvPicPr>
+            <p:cNvPr id="6" name="图片 5">
+              <a:extLst>
+                <a:ext uri="{FF2B5EF4-FFF2-40B4-BE49-F238E27FC236}">
+                  <a16:creationId xmlns:a16="http://schemas.microsoft.com/office/drawing/2014/main" id="{4962951B-5338-4758-BB39-5E367967C6DE}"/>
+                </a:ext>
+              </a:extLst>
+            </p:cNvPr>
+            <p:cNvPicPr>
+              <a:picLocks noChangeAspect="1"/>
+            </p:cNvPicPr>
+            <p:nvPr/>
+          </p:nvPicPr>
+          <p:blipFill>
+            <a:blip r:embed="rId2"/>
+            <a:stretch>
+              <a:fillRect/>
+            </a:stretch>
+          </p:blipFill>
+          <p:spPr>
+            <a:xfrm>
+              <a:off x="10182476" y="9722"/>
+              <a:ext cx="2009524" cy="2009524"/>
+            </a:xfrm>
+            <a:prstGeom prst="rect">
+              <a:avLst/>
+            </a:prstGeom>
+          </p:spPr>
+        </p:pic>
+      </p:grpSp>
+      <p:grpSp>
+        <p:nvGrpSpPr>
+          <p:cNvPr id="7" name="组合 6">
+            <a:extLst>
+              <a:ext uri="{FF2B5EF4-FFF2-40B4-BE49-F238E27FC236}">
+                <a16:creationId xmlns:a16="http://schemas.microsoft.com/office/drawing/2014/main" id="{F17A27B8-B874-4CE5-A9E7-1987215D94A0}"/>
+              </a:ext>
+            </a:extLst>
+          </p:cNvPr>
+          <p:cNvGrpSpPr/>
+          <p:nvPr/>
+        </p:nvGrpSpPr>
+        <p:grpSpPr>
+          <a:xfrm>
+            <a:off x="63844" y="482049"/>
+            <a:ext cx="3128341" cy="2806003"/>
+            <a:chOff x="7974985" y="0"/>
+            <a:chExt cx="2009524" cy="2010179"/>
+          </a:xfrm>
+        </p:grpSpPr>
+        <p:sp>
+          <p:nvSpPr>
+            <p:cNvPr id="8" name="矩形 7">
+              <a:extLst>
+                <a:ext uri="{FF2B5EF4-FFF2-40B4-BE49-F238E27FC236}">
+                  <a16:creationId xmlns:a16="http://schemas.microsoft.com/office/drawing/2014/main" id="{0E7BA8F6-F3AB-489C-BC27-A96A1F95BCB3}"/>
+                </a:ext>
+              </a:extLst>
+            </p:cNvPr>
+            <p:cNvSpPr/>
+            <p:nvPr/>
+          </p:nvSpPr>
+          <p:spPr>
+            <a:xfrm>
+              <a:off x="7974985" y="0"/>
+              <a:ext cx="2009524" cy="2010179"/>
+            </a:xfrm>
+            <a:prstGeom prst="rect">
+              <a:avLst/>
+            </a:prstGeom>
+            <a:solidFill>
+              <a:schemeClr val="bg1"/>
+            </a:solidFill>
+            <a:ln>
+              <a:solidFill>
+                <a:schemeClr val="bg1"/>
+              </a:solidFill>
+            </a:ln>
+          </p:spPr>
+          <p:style>
+            <a:lnRef idx="2">
+              <a:schemeClr val="accent1">
+                <a:shade val="50000"/>
+              </a:schemeClr>
+            </a:lnRef>
+            <a:fillRef idx="1">
+              <a:schemeClr val="accent1"/>
+            </a:fillRef>
+            <a:effectRef idx="0">
+              <a:schemeClr val="accent1"/>
+            </a:effectRef>
+            <a:fontRef idx="minor">
+              <a:schemeClr val="lt1"/>
+            </a:fontRef>
+          </p:style>
+          <p:txBody>
+            <a:bodyPr rtlCol="0" anchor="ctr"/>
+            <a:lstStyle/>
+            <a:p>
+              <a:pPr algn="ctr"/>
+              <a:endParaRPr lang="zh-CN" altLang="en-US"/>
+            </a:p>
+          </p:txBody>
+        </p:sp>
+        <p:pic>
+          <p:nvPicPr>
+            <p:cNvPr id="9" name="图片 8">
+              <a:extLst>
+                <a:ext uri="{FF2B5EF4-FFF2-40B4-BE49-F238E27FC236}">
+                  <a16:creationId xmlns:a16="http://schemas.microsoft.com/office/drawing/2014/main" id="{4F8BD134-75E8-43BE-AA37-62B57F85C4B8}"/>
+                </a:ext>
+              </a:extLst>
+            </p:cNvPr>
+            <p:cNvPicPr>
+              <a:picLocks noChangeAspect="1"/>
+            </p:cNvPicPr>
+            <p:nvPr/>
+          </p:nvPicPr>
+          <p:blipFill rotWithShape="1">
+            <a:blip r:embed="rId3"/>
+            <a:srcRect l="4409" t="11199" r="11642" b="6798"/>
+            <a:stretch/>
+          </p:blipFill>
+          <p:spPr>
+            <a:xfrm>
+              <a:off x="8052863" y="141488"/>
+              <a:ext cx="1442119" cy="1745674"/>
+            </a:xfrm>
+            <a:prstGeom prst="rect">
+              <a:avLst/>
+            </a:prstGeom>
+          </p:spPr>
+        </p:pic>
+      </p:grpSp>
+      <p:grpSp>
+        <p:nvGrpSpPr>
+          <p:cNvPr id="16" name="组合 15">
+            <a:extLst>
+              <a:ext uri="{FF2B5EF4-FFF2-40B4-BE49-F238E27FC236}">
+                <a16:creationId xmlns:a16="http://schemas.microsoft.com/office/drawing/2014/main" id="{77EA2504-47A6-4DC4-83CE-C74360101EDD}"/>
+              </a:ext>
+            </a:extLst>
+          </p:cNvPr>
+          <p:cNvGrpSpPr/>
+          <p:nvPr/>
+        </p:nvGrpSpPr>
+        <p:grpSpPr>
+          <a:xfrm>
+            <a:off x="4011359" y="457942"/>
+            <a:ext cx="2880000" cy="2880000"/>
+            <a:chOff x="4503195" y="585783"/>
+            <a:chExt cx="2880000" cy="2880000"/>
+          </a:xfrm>
+        </p:grpSpPr>
+        <p:sp>
+          <p:nvSpPr>
+            <p:cNvPr id="12" name="矩形 11">
+              <a:extLst>
+                <a:ext uri="{FF2B5EF4-FFF2-40B4-BE49-F238E27FC236}">
+                  <a16:creationId xmlns:a16="http://schemas.microsoft.com/office/drawing/2014/main" id="{883C9291-C137-49BB-B7FC-2624DAD619DC}"/>
+                </a:ext>
+              </a:extLst>
+            </p:cNvPr>
+            <p:cNvSpPr/>
+            <p:nvPr/>
+          </p:nvSpPr>
+          <p:spPr>
+            <a:xfrm>
+              <a:off x="4503195" y="585783"/>
+              <a:ext cx="2880000" cy="2880000"/>
+            </a:xfrm>
+            <a:prstGeom prst="rect">
+              <a:avLst/>
+            </a:prstGeom>
+            <a:solidFill>
+              <a:schemeClr val="bg1"/>
+            </a:solidFill>
+            <a:ln>
+              <a:solidFill>
+                <a:schemeClr val="bg1"/>
+              </a:solidFill>
+            </a:ln>
+          </p:spPr>
+          <p:style>
+            <a:lnRef idx="2">
+              <a:schemeClr val="accent1">
+                <a:shade val="50000"/>
+              </a:schemeClr>
+            </a:lnRef>
+            <a:fillRef idx="1">
+              <a:schemeClr val="accent1"/>
+            </a:fillRef>
+            <a:effectRef idx="0">
+              <a:schemeClr val="accent1"/>
+            </a:effectRef>
+            <a:fontRef idx="minor">
+              <a:schemeClr val="lt1"/>
+            </a:fontRef>
+          </p:style>
+          <p:txBody>
+            <a:bodyPr rtlCol="0" anchor="ctr"/>
+            <a:lstStyle/>
+            <a:p>
+              <a:pPr algn="ctr"/>
+              <a:endParaRPr lang="zh-CN" altLang="en-US"/>
+            </a:p>
+          </p:txBody>
+        </p:sp>
+        <p:pic>
+          <p:nvPicPr>
+            <p:cNvPr id="10" name="图片 9">
+              <a:extLst>
+                <a:ext uri="{FF2B5EF4-FFF2-40B4-BE49-F238E27FC236}">
+                  <a16:creationId xmlns:a16="http://schemas.microsoft.com/office/drawing/2014/main" id="{A1D90E30-02D6-4E2E-AFA1-CC81DC5FBDD0}"/>
+                </a:ext>
+              </a:extLst>
+            </p:cNvPr>
+            <p:cNvPicPr>
+              <a:picLocks noChangeAspect="1"/>
+            </p:cNvPicPr>
+            <p:nvPr/>
+          </p:nvPicPr>
+          <p:blipFill>
+            <a:blip r:embed="rId4"/>
+            <a:stretch>
+              <a:fillRect/>
+            </a:stretch>
+          </p:blipFill>
+          <p:spPr>
+            <a:xfrm>
+              <a:off x="4503195" y="800520"/>
+              <a:ext cx="2880000" cy="2450526"/>
+            </a:xfrm>
+            <a:prstGeom prst="rect">
+              <a:avLst/>
+            </a:prstGeom>
+          </p:spPr>
+        </p:pic>
+      </p:grpSp>
+      <p:grpSp>
+        <p:nvGrpSpPr>
+          <p:cNvPr id="20" name="组合 19">
+            <a:extLst>
+              <a:ext uri="{FF2B5EF4-FFF2-40B4-BE49-F238E27FC236}">
+                <a16:creationId xmlns:a16="http://schemas.microsoft.com/office/drawing/2014/main" id="{F1291D0F-86FB-4FB3-880E-F52BA6CBC146}"/>
+              </a:ext>
+            </a:extLst>
+          </p:cNvPr>
+          <p:cNvGrpSpPr/>
+          <p:nvPr/>
+        </p:nvGrpSpPr>
+        <p:grpSpPr>
+          <a:xfrm>
+            <a:off x="4011359" y="3734796"/>
+            <a:ext cx="2880000" cy="2880000"/>
+            <a:chOff x="7890631" y="679552"/>
+            <a:chExt cx="2880000" cy="2880000"/>
+          </a:xfrm>
+        </p:grpSpPr>
+        <p:sp>
+          <p:nvSpPr>
+            <p:cNvPr id="19" name="矩形 18">
+              <a:extLst>
+                <a:ext uri="{FF2B5EF4-FFF2-40B4-BE49-F238E27FC236}">
+                  <a16:creationId xmlns:a16="http://schemas.microsoft.com/office/drawing/2014/main" id="{B3904D96-F992-4CAD-8FB0-3C59075D32B7}"/>
+                </a:ext>
+              </a:extLst>
+            </p:cNvPr>
+            <p:cNvSpPr/>
+            <p:nvPr/>
+          </p:nvSpPr>
+          <p:spPr>
+            <a:xfrm>
+              <a:off x="7890631" y="679552"/>
+              <a:ext cx="2880000" cy="2880000"/>
+            </a:xfrm>
+            <a:prstGeom prst="rect">
+              <a:avLst/>
+            </a:prstGeom>
+            <a:solidFill>
+              <a:schemeClr val="bg1"/>
+            </a:solidFill>
+            <a:ln>
+              <a:solidFill>
+                <a:schemeClr val="bg1"/>
+              </a:solidFill>
+            </a:ln>
+          </p:spPr>
+          <p:style>
+            <a:lnRef idx="2">
+              <a:schemeClr val="accent1">
+                <a:shade val="50000"/>
+              </a:schemeClr>
+            </a:lnRef>
+            <a:fillRef idx="1">
+              <a:schemeClr val="accent1"/>
+            </a:fillRef>
+            <a:effectRef idx="0">
+              <a:schemeClr val="accent1"/>
+            </a:effectRef>
+            <a:fontRef idx="minor">
+              <a:schemeClr val="lt1"/>
+            </a:fontRef>
+          </p:style>
+          <p:txBody>
+            <a:bodyPr rtlCol="0" anchor="ctr"/>
+            <a:lstStyle/>
+            <a:p>
+              <a:pPr algn="ctr"/>
+              <a:endParaRPr lang="zh-CN" altLang="en-US"/>
+            </a:p>
+          </p:txBody>
+        </p:sp>
+        <p:pic>
+          <p:nvPicPr>
+            <p:cNvPr id="17" name="图片 16">
+              <a:extLst>
+                <a:ext uri="{FF2B5EF4-FFF2-40B4-BE49-F238E27FC236}">
+                  <a16:creationId xmlns:a16="http://schemas.microsoft.com/office/drawing/2014/main" id="{D7788116-BB30-40ED-B242-2699891C5875}"/>
+                </a:ext>
+              </a:extLst>
+            </p:cNvPr>
+            <p:cNvPicPr>
+              <a:picLocks noChangeAspect="1"/>
+            </p:cNvPicPr>
+            <p:nvPr/>
+          </p:nvPicPr>
+          <p:blipFill>
+            <a:blip r:embed="rId5"/>
+            <a:stretch>
+              <a:fillRect/>
+            </a:stretch>
+          </p:blipFill>
+          <p:spPr>
+            <a:xfrm>
+              <a:off x="7890631" y="984861"/>
+              <a:ext cx="2880000" cy="2269382"/>
+            </a:xfrm>
+            <a:prstGeom prst="rect">
+              <a:avLst/>
+            </a:prstGeom>
+          </p:spPr>
+        </p:pic>
+      </p:grpSp>
+    </p:spTree>
+    <p:extLst>
+      <p:ext uri="{BB962C8B-B14F-4D97-AF65-F5344CB8AC3E}">
+        <p14:creationId xmlns:p14="http://schemas.microsoft.com/office/powerpoint/2010/main" val="2385202454"/>
       </p:ext>
     </p:extLst>
   </p:cSld>

</xml_diff>